<commit_message>
Ng Single App Creation
</commit_message>
<xml_diff>
--- a/Ng-Byte.pptx
+++ b/Ng-Byte.pptx
@@ -5,7 +5,7 @@
     <p:sldMasterId id="2147483648" r:id="rId1"/>
   </p:sldMasterIdLst>
   <p:notesMasterIdLst>
-    <p:notesMasterId r:id="rId84"/>
+    <p:notesMasterId r:id="rId90"/>
   </p:notesMasterIdLst>
   <p:sldIdLst>
     <p:sldId id="257" r:id="rId2"/>
@@ -89,7 +89,13 @@
     <p:sldId id="308" r:id="rId80"/>
     <p:sldId id="459" r:id="rId81"/>
     <p:sldId id="364" r:id="rId82"/>
-    <p:sldId id="301" r:id="rId83"/>
+    <p:sldId id="539" r:id="rId83"/>
+    <p:sldId id="379" r:id="rId84"/>
+    <p:sldId id="540" r:id="rId85"/>
+    <p:sldId id="378" r:id="rId86"/>
+    <p:sldId id="282" r:id="rId87"/>
+    <p:sldId id="460" r:id="rId88"/>
+    <p:sldId id="301" r:id="rId89"/>
   </p:sldIdLst>
   <p:sldSz cx="12192000" cy="6858000"/>
   <p:notesSz cx="6858000" cy="9144000"/>
@@ -8617,7 +8623,7 @@
           <a:p>
             <a:fld id="{71294FA1-AFAA-4215-99D0-544C2090ADBF}" type="datetimeFigureOut">
               <a:rPr lang="en-IN" smtClean="0"/>
-              <a:t>26-07-2023</a:t>
+              <a:t>27-07-2023</a:t>
             </a:fld>
             <a:endParaRPr lang="en-IN"/>
           </a:p>
@@ -9394,7 +9400,7 @@
           <a:p>
             <a:fld id="{AC383B1E-3E1F-4FB8-B611-6F0F06E0FE57}" type="datetimeFigureOut">
               <a:rPr lang="en-US" smtClean="0"/>
-              <a:t>7/26/2023</a:t>
+              <a:t>7/27/2023</a:t>
             </a:fld>
             <a:endParaRPr lang="en-US"/>
           </a:p>
@@ -9592,7 +9598,7 @@
           <a:p>
             <a:fld id="{AC383B1E-3E1F-4FB8-B611-6F0F06E0FE57}" type="datetimeFigureOut">
               <a:rPr lang="en-US" smtClean="0"/>
-              <a:t>7/26/2023</a:t>
+              <a:t>7/27/2023</a:t>
             </a:fld>
             <a:endParaRPr lang="en-US"/>
           </a:p>
@@ -9800,7 +9806,7 @@
           <a:p>
             <a:fld id="{AC383B1E-3E1F-4FB8-B611-6F0F06E0FE57}" type="datetimeFigureOut">
               <a:rPr lang="en-US" smtClean="0"/>
-              <a:t>7/26/2023</a:t>
+              <a:t>7/27/2023</a:t>
             </a:fld>
             <a:endParaRPr lang="en-US"/>
           </a:p>
@@ -9998,7 +10004,7 @@
           <a:p>
             <a:fld id="{AC383B1E-3E1F-4FB8-B611-6F0F06E0FE57}" type="datetimeFigureOut">
               <a:rPr lang="en-US" smtClean="0"/>
-              <a:t>7/26/2023</a:t>
+              <a:t>7/27/2023</a:t>
             </a:fld>
             <a:endParaRPr lang="en-US"/>
           </a:p>
@@ -10273,7 +10279,7 @@
           <a:p>
             <a:fld id="{AC383B1E-3E1F-4FB8-B611-6F0F06E0FE57}" type="datetimeFigureOut">
               <a:rPr lang="en-US" smtClean="0"/>
-              <a:t>7/26/2023</a:t>
+              <a:t>7/27/2023</a:t>
             </a:fld>
             <a:endParaRPr lang="en-US"/>
           </a:p>
@@ -10538,7 +10544,7 @@
           <a:p>
             <a:fld id="{AC383B1E-3E1F-4FB8-B611-6F0F06E0FE57}" type="datetimeFigureOut">
               <a:rPr lang="en-US" smtClean="0"/>
-              <a:t>7/26/2023</a:t>
+              <a:t>7/27/2023</a:t>
             </a:fld>
             <a:endParaRPr lang="en-US"/>
           </a:p>
@@ -10950,7 +10956,7 @@
           <a:p>
             <a:fld id="{AC383B1E-3E1F-4FB8-B611-6F0F06E0FE57}" type="datetimeFigureOut">
               <a:rPr lang="en-US" smtClean="0"/>
-              <a:t>7/26/2023</a:t>
+              <a:t>7/27/2023</a:t>
             </a:fld>
             <a:endParaRPr lang="en-US"/>
           </a:p>
@@ -11091,7 +11097,7 @@
           <a:p>
             <a:fld id="{AC383B1E-3E1F-4FB8-B611-6F0F06E0FE57}" type="datetimeFigureOut">
               <a:rPr lang="en-US" smtClean="0"/>
-              <a:t>7/26/2023</a:t>
+              <a:t>7/27/2023</a:t>
             </a:fld>
             <a:endParaRPr lang="en-US"/>
           </a:p>
@@ -11204,7 +11210,7 @@
           <a:p>
             <a:fld id="{AC383B1E-3E1F-4FB8-B611-6F0F06E0FE57}" type="datetimeFigureOut">
               <a:rPr lang="en-US" smtClean="0"/>
-              <a:t>7/26/2023</a:t>
+              <a:t>7/27/2023</a:t>
             </a:fld>
             <a:endParaRPr lang="en-US"/>
           </a:p>
@@ -11515,7 +11521,7 @@
           <a:p>
             <a:fld id="{AC383B1E-3E1F-4FB8-B611-6F0F06E0FE57}" type="datetimeFigureOut">
               <a:rPr lang="en-US" smtClean="0"/>
-              <a:t>7/26/2023</a:t>
+              <a:t>7/27/2023</a:t>
             </a:fld>
             <a:endParaRPr lang="en-US"/>
           </a:p>
@@ -11803,7 +11809,7 @@
           <a:p>
             <a:fld id="{AC383B1E-3E1F-4FB8-B611-6F0F06E0FE57}" type="datetimeFigureOut">
               <a:rPr lang="en-US" smtClean="0"/>
-              <a:t>7/26/2023</a:t>
+              <a:t>7/27/2023</a:t>
             </a:fld>
             <a:endParaRPr lang="en-US"/>
           </a:p>
@@ -12044,7 +12050,7 @@
           <a:p>
             <a:fld id="{AC383B1E-3E1F-4FB8-B611-6F0F06E0FE57}" type="datetimeFigureOut">
               <a:rPr lang="en-US" smtClean="0"/>
-              <a:t>7/26/2023</a:t>
+              <a:t>7/27/2023</a:t>
             </a:fld>
             <a:endParaRPr lang="en-US"/>
           </a:p>
@@ -37673,6 +37679,1686 @@
 <file path=ppt/slides/slide82.xml><?xml version="1.0" encoding="utf-8"?>
 <p:sld xmlns:a="http://schemas.openxmlformats.org/drawingml/2006/main" xmlns:r="http://schemas.openxmlformats.org/officeDocument/2006/relationships" xmlns:p="http://schemas.openxmlformats.org/presentationml/2006/main">
   <p:cSld>
+    <p:spTree>
+      <p:nvGrpSpPr>
+        <p:cNvPr id="1" name=""/>
+        <p:cNvGrpSpPr/>
+        <p:nvPr/>
+      </p:nvGrpSpPr>
+      <p:grpSpPr>
+        <a:xfrm>
+          <a:off x="0" y="0"/>
+          <a:ext cx="0" cy="0"/>
+          <a:chOff x="0" y="0"/>
+          <a:chExt cx="0" cy="0"/>
+        </a:xfrm>
+      </p:grpSpPr>
+      <p:sp>
+        <p:nvSpPr>
+          <p:cNvPr id="2" name="Title 1">
+            <a:extLst>
+              <a:ext uri="{FF2B5EF4-FFF2-40B4-BE49-F238E27FC236}">
+                <a16:creationId xmlns:a16="http://schemas.microsoft.com/office/drawing/2014/main" id="{3E111E2F-B291-418C-841E-35D10A7537E1}"/>
+              </a:ext>
+            </a:extLst>
+          </p:cNvPr>
+          <p:cNvSpPr>
+            <a:spLocks noGrp="1"/>
+          </p:cNvSpPr>
+          <p:nvPr>
+            <p:ph type="title"/>
+          </p:nvPr>
+        </p:nvSpPr>
+        <p:spPr>
+          <a:xfrm>
+            <a:off x="645065" y="1097280"/>
+            <a:ext cx="3796306" cy="4666207"/>
+          </a:xfrm>
+        </p:spPr>
+        <p:txBody>
+          <a:bodyPr anchor="ctr">
+            <a:normAutofit/>
+          </a:bodyPr>
+          <a:lstStyle/>
+          <a:p>
+            <a:r>
+              <a:rPr lang="en-IN" sz="4800"/>
+              <a:t>Angular CLI (Commands)</a:t>
+            </a:r>
+          </a:p>
+        </p:txBody>
+      </p:sp>
+      <p:graphicFrame>
+        <p:nvGraphicFramePr>
+          <p:cNvPr id="7" name="Content Placeholder 6">
+            <a:extLst>
+              <a:ext uri="{FF2B5EF4-FFF2-40B4-BE49-F238E27FC236}">
+                <a16:creationId xmlns:a16="http://schemas.microsoft.com/office/drawing/2014/main" id="{3BD316A2-0619-463A-98AF-99E90FD451FD}"/>
+              </a:ext>
+            </a:extLst>
+          </p:cNvPr>
+          <p:cNvGraphicFramePr>
+            <a:graphicFrameLocks noGrp="1"/>
+          </p:cNvGraphicFramePr>
+          <p:nvPr>
+            <p:ph idx="1"/>
+          </p:nvPr>
+        </p:nvGraphicFramePr>
+        <p:xfrm>
+          <a:off x="5460411" y="354487"/>
+          <a:ext cx="5918185" cy="6149025"/>
+        </p:xfrm>
+        <a:graphic>
+          <a:graphicData uri="http://schemas.openxmlformats.org/drawingml/2006/table">
+            <a:tbl>
+              <a:tblPr>
+                <a:tableStyleId>{2D5ABB26-0587-4C30-8999-92F81FD0307C}</a:tableStyleId>
+              </a:tblPr>
+              <a:tblGrid>
+                <a:gridCol w="3113245">
+                  <a:extLst>
+                    <a:ext uri="{9D8B030D-6E8A-4147-A177-3AD203B41FA5}">
+                      <a16:colId xmlns:a16="http://schemas.microsoft.com/office/drawing/2014/main" val="3267156907"/>
+                    </a:ext>
+                  </a:extLst>
+                </a:gridCol>
+                <a:gridCol w="2804940">
+                  <a:extLst>
+                    <a:ext uri="{9D8B030D-6E8A-4147-A177-3AD203B41FA5}">
+                      <a16:colId xmlns:a16="http://schemas.microsoft.com/office/drawing/2014/main" val="4036792527"/>
+                    </a:ext>
+                  </a:extLst>
+                </a:gridCol>
+              </a:tblGrid>
+              <a:tr h="683225">
+                <a:tc>
+                  <a:txBody>
+                    <a:bodyPr/>
+                    <a:lstStyle/>
+                    <a:p>
+                      <a:pPr algn="l" fontAlgn="ctr">
+                        <a:spcBef>
+                          <a:spcPts val="0"/>
+                        </a:spcBef>
+                        <a:spcAft>
+                          <a:spcPts val="0"/>
+                        </a:spcAft>
+                      </a:pPr>
+                      <a:r>
+                        <a:rPr lang="en-IN" sz="2800" b="0" u="none" strike="noStrike">
+                          <a:solidFill>
+                            <a:srgbClr val="000000"/>
+                          </a:solidFill>
+                          <a:effectLst/>
+                        </a:rPr>
+                        <a:t>ng add</a:t>
+                      </a:r>
+                      <a:endParaRPr lang="en-IN" sz="2800" b="0" i="0" u="none" strike="noStrike">
+                        <a:effectLst/>
+                        <a:latin typeface="Arial" panose="020B0604020202020204" pitchFamily="34" charset="0"/>
+                      </a:endParaRPr>
+                    </a:p>
+                  </a:txBody>
+                  <a:tcPr marL="14226" marR="14226" marT="14226" marB="0" anchor="ctr"/>
+                </a:tc>
+                <a:tc>
+                  <a:txBody>
+                    <a:bodyPr/>
+                    <a:lstStyle/>
+                    <a:p>
+                      <a:pPr algn="l" fontAlgn="ctr">
+                        <a:spcBef>
+                          <a:spcPts val="0"/>
+                        </a:spcBef>
+                        <a:spcAft>
+                          <a:spcPts val="0"/>
+                        </a:spcAft>
+                      </a:pPr>
+                      <a:r>
+                        <a:rPr lang="en-IN" sz="2800" b="1" u="none" strike="noStrike" dirty="0">
+                          <a:solidFill>
+                            <a:srgbClr val="000000"/>
+                          </a:solidFill>
+                          <a:effectLst/>
+                        </a:rPr>
+                        <a:t>ng help</a:t>
+                      </a:r>
+                      <a:endParaRPr lang="en-IN" sz="2800" b="1" i="0" u="none" strike="noStrike" dirty="0">
+                        <a:effectLst/>
+                        <a:latin typeface="Arial" panose="020B0604020202020204" pitchFamily="34" charset="0"/>
+                      </a:endParaRPr>
+                    </a:p>
+                  </a:txBody>
+                  <a:tcPr marL="14226" marR="14226" marT="14226" marB="0" anchor="ctr"/>
+                </a:tc>
+                <a:extLst>
+                  <a:ext uri="{0D108BD9-81ED-4DB2-BD59-A6C34878D82A}">
+                    <a16:rowId xmlns:a16="http://schemas.microsoft.com/office/drawing/2014/main" val="2179050513"/>
+                  </a:ext>
+                </a:extLst>
+              </a:tr>
+              <a:tr h="683225">
+                <a:tc>
+                  <a:txBody>
+                    <a:bodyPr/>
+                    <a:lstStyle/>
+                    <a:p>
+                      <a:pPr algn="l" fontAlgn="ctr">
+                        <a:spcBef>
+                          <a:spcPts val="0"/>
+                        </a:spcBef>
+                        <a:spcAft>
+                          <a:spcPts val="0"/>
+                        </a:spcAft>
+                      </a:pPr>
+                      <a:r>
+                        <a:rPr lang="en-IN" sz="2800" b="0" u="none" strike="noStrike">
+                          <a:solidFill>
+                            <a:srgbClr val="000000"/>
+                          </a:solidFill>
+                          <a:effectLst/>
+                        </a:rPr>
+                        <a:t>ng analytics</a:t>
+                      </a:r>
+                      <a:endParaRPr lang="en-IN" sz="2800" b="0" i="0" u="none" strike="noStrike">
+                        <a:effectLst/>
+                        <a:latin typeface="Arial" panose="020B0604020202020204" pitchFamily="34" charset="0"/>
+                      </a:endParaRPr>
+                    </a:p>
+                  </a:txBody>
+                  <a:tcPr marL="14226" marR="14226" marT="14226" marB="0" anchor="ctr"/>
+                </a:tc>
+                <a:tc>
+                  <a:txBody>
+                    <a:bodyPr/>
+                    <a:lstStyle/>
+                    <a:p>
+                      <a:pPr algn="l" fontAlgn="ctr">
+                        <a:spcBef>
+                          <a:spcPts val="0"/>
+                        </a:spcBef>
+                        <a:spcAft>
+                          <a:spcPts val="0"/>
+                        </a:spcAft>
+                      </a:pPr>
+                      <a:r>
+                        <a:rPr lang="en-IN" sz="2800" b="0" u="none" strike="noStrike">
+                          <a:solidFill>
+                            <a:srgbClr val="000000"/>
+                          </a:solidFill>
+                          <a:effectLst/>
+                        </a:rPr>
+                        <a:t>ng lint</a:t>
+                      </a:r>
+                      <a:endParaRPr lang="en-IN" sz="2800" b="0" i="0" u="none" strike="noStrike">
+                        <a:effectLst/>
+                        <a:latin typeface="Arial" panose="020B0604020202020204" pitchFamily="34" charset="0"/>
+                      </a:endParaRPr>
+                    </a:p>
+                  </a:txBody>
+                  <a:tcPr marL="14226" marR="14226" marT="14226" marB="0" anchor="ctr"/>
+                </a:tc>
+                <a:extLst>
+                  <a:ext uri="{0D108BD9-81ED-4DB2-BD59-A6C34878D82A}">
+                    <a16:rowId xmlns:a16="http://schemas.microsoft.com/office/drawing/2014/main" val="2283873825"/>
+                  </a:ext>
+                </a:extLst>
+              </a:tr>
+              <a:tr h="683225">
+                <a:tc>
+                  <a:txBody>
+                    <a:bodyPr/>
+                    <a:lstStyle/>
+                    <a:p>
+                      <a:pPr algn="l" fontAlgn="ctr">
+                        <a:spcBef>
+                          <a:spcPts val="0"/>
+                        </a:spcBef>
+                        <a:spcAft>
+                          <a:spcPts val="0"/>
+                        </a:spcAft>
+                      </a:pPr>
+                      <a:r>
+                        <a:rPr lang="en-IN" sz="2800" b="0" u="none" strike="noStrike">
+                          <a:solidFill>
+                            <a:srgbClr val="000000"/>
+                          </a:solidFill>
+                          <a:effectLst/>
+                        </a:rPr>
+                        <a:t>ng build</a:t>
+                      </a:r>
+                      <a:endParaRPr lang="en-IN" sz="2800" b="0" i="0" u="none" strike="noStrike">
+                        <a:effectLst/>
+                        <a:latin typeface="Arial" panose="020B0604020202020204" pitchFamily="34" charset="0"/>
+                      </a:endParaRPr>
+                    </a:p>
+                  </a:txBody>
+                  <a:tcPr marL="14226" marR="14226" marT="14226" marB="0" anchor="ctr"/>
+                </a:tc>
+                <a:tc>
+                  <a:txBody>
+                    <a:bodyPr/>
+                    <a:lstStyle/>
+                    <a:p>
+                      <a:pPr algn="l" fontAlgn="ctr">
+                        <a:spcBef>
+                          <a:spcPts val="0"/>
+                        </a:spcBef>
+                        <a:spcAft>
+                          <a:spcPts val="0"/>
+                        </a:spcAft>
+                      </a:pPr>
+                      <a:r>
+                        <a:rPr lang="en-IN" sz="2800" b="0" u="none" strike="noStrike">
+                          <a:solidFill>
+                            <a:srgbClr val="000000"/>
+                          </a:solidFill>
+                          <a:effectLst/>
+                        </a:rPr>
+                        <a:t>ng new</a:t>
+                      </a:r>
+                      <a:endParaRPr lang="en-IN" sz="2800" b="0" i="0" u="none" strike="noStrike">
+                        <a:effectLst/>
+                        <a:latin typeface="Arial" panose="020B0604020202020204" pitchFamily="34" charset="0"/>
+                      </a:endParaRPr>
+                    </a:p>
+                  </a:txBody>
+                  <a:tcPr marL="14226" marR="14226" marT="14226" marB="0" anchor="ctr"/>
+                </a:tc>
+                <a:extLst>
+                  <a:ext uri="{0D108BD9-81ED-4DB2-BD59-A6C34878D82A}">
+                    <a16:rowId xmlns:a16="http://schemas.microsoft.com/office/drawing/2014/main" val="2072568804"/>
+                  </a:ext>
+                </a:extLst>
+              </a:tr>
+              <a:tr h="683225">
+                <a:tc>
+                  <a:txBody>
+                    <a:bodyPr/>
+                    <a:lstStyle/>
+                    <a:p>
+                      <a:pPr algn="l" fontAlgn="ctr">
+                        <a:spcBef>
+                          <a:spcPts val="0"/>
+                        </a:spcBef>
+                        <a:spcAft>
+                          <a:spcPts val="0"/>
+                        </a:spcAft>
+                      </a:pPr>
+                      <a:r>
+                        <a:rPr lang="en-IN" sz="2800" b="0" u="none" strike="noStrike">
+                          <a:solidFill>
+                            <a:srgbClr val="000000"/>
+                          </a:solidFill>
+                          <a:effectLst/>
+                        </a:rPr>
+                        <a:t>ng config</a:t>
+                      </a:r>
+                      <a:endParaRPr lang="en-IN" sz="2800" b="0" i="0" u="none" strike="noStrike">
+                        <a:effectLst/>
+                        <a:latin typeface="Arial" panose="020B0604020202020204" pitchFamily="34" charset="0"/>
+                      </a:endParaRPr>
+                    </a:p>
+                  </a:txBody>
+                  <a:tcPr marL="14226" marR="14226" marT="14226" marB="0" anchor="ctr"/>
+                </a:tc>
+                <a:tc>
+                  <a:txBody>
+                    <a:bodyPr/>
+                    <a:lstStyle/>
+                    <a:p>
+                      <a:pPr algn="l" fontAlgn="ctr">
+                        <a:spcBef>
+                          <a:spcPts val="0"/>
+                        </a:spcBef>
+                        <a:spcAft>
+                          <a:spcPts val="0"/>
+                        </a:spcAft>
+                      </a:pPr>
+                      <a:r>
+                        <a:rPr lang="en-IN" sz="2800" b="0" u="none" strike="noStrike">
+                          <a:solidFill>
+                            <a:srgbClr val="000000"/>
+                          </a:solidFill>
+                          <a:effectLst/>
+                        </a:rPr>
+                        <a:t>ng run</a:t>
+                      </a:r>
+                      <a:endParaRPr lang="en-IN" sz="2800" b="0" i="0" u="none" strike="noStrike">
+                        <a:effectLst/>
+                        <a:latin typeface="Arial" panose="020B0604020202020204" pitchFamily="34" charset="0"/>
+                      </a:endParaRPr>
+                    </a:p>
+                  </a:txBody>
+                  <a:tcPr marL="14226" marR="14226" marT="14226" marB="0" anchor="ctr"/>
+                </a:tc>
+                <a:extLst>
+                  <a:ext uri="{0D108BD9-81ED-4DB2-BD59-A6C34878D82A}">
+                    <a16:rowId xmlns:a16="http://schemas.microsoft.com/office/drawing/2014/main" val="2515149304"/>
+                  </a:ext>
+                </a:extLst>
+              </a:tr>
+              <a:tr h="683225">
+                <a:tc>
+                  <a:txBody>
+                    <a:bodyPr/>
+                    <a:lstStyle/>
+                    <a:p>
+                      <a:pPr algn="l" fontAlgn="ctr">
+                        <a:spcBef>
+                          <a:spcPts val="0"/>
+                        </a:spcBef>
+                        <a:spcAft>
+                          <a:spcPts val="0"/>
+                        </a:spcAft>
+                      </a:pPr>
+                      <a:r>
+                        <a:rPr lang="en-IN" sz="2800" b="0" u="none" strike="noStrike">
+                          <a:solidFill>
+                            <a:srgbClr val="000000"/>
+                          </a:solidFill>
+                          <a:effectLst/>
+                        </a:rPr>
+                        <a:t>ng deploy</a:t>
+                      </a:r>
+                      <a:endParaRPr lang="en-IN" sz="2800" b="0" i="0" u="none" strike="noStrike">
+                        <a:effectLst/>
+                        <a:latin typeface="Arial" panose="020B0604020202020204" pitchFamily="34" charset="0"/>
+                      </a:endParaRPr>
+                    </a:p>
+                  </a:txBody>
+                  <a:tcPr marL="14226" marR="14226" marT="14226" marB="0" anchor="ctr"/>
+                </a:tc>
+                <a:tc>
+                  <a:txBody>
+                    <a:bodyPr/>
+                    <a:lstStyle/>
+                    <a:p>
+                      <a:pPr algn="l" fontAlgn="ctr">
+                        <a:spcBef>
+                          <a:spcPts val="0"/>
+                        </a:spcBef>
+                        <a:spcAft>
+                          <a:spcPts val="0"/>
+                        </a:spcAft>
+                      </a:pPr>
+                      <a:r>
+                        <a:rPr lang="en-IN" sz="2800" b="0" u="none" strike="noStrike">
+                          <a:solidFill>
+                            <a:srgbClr val="000000"/>
+                          </a:solidFill>
+                          <a:effectLst/>
+                        </a:rPr>
+                        <a:t>ng serve</a:t>
+                      </a:r>
+                      <a:endParaRPr lang="en-IN" sz="2800" b="0" i="0" u="none" strike="noStrike">
+                        <a:effectLst/>
+                        <a:latin typeface="Arial" panose="020B0604020202020204" pitchFamily="34" charset="0"/>
+                      </a:endParaRPr>
+                    </a:p>
+                  </a:txBody>
+                  <a:tcPr marL="14226" marR="14226" marT="14226" marB="0" anchor="ctr"/>
+                </a:tc>
+                <a:extLst>
+                  <a:ext uri="{0D108BD9-81ED-4DB2-BD59-A6C34878D82A}">
+                    <a16:rowId xmlns:a16="http://schemas.microsoft.com/office/drawing/2014/main" val="3363396690"/>
+                  </a:ext>
+                </a:extLst>
+              </a:tr>
+              <a:tr h="683225">
+                <a:tc>
+                  <a:txBody>
+                    <a:bodyPr/>
+                    <a:lstStyle/>
+                    <a:p>
+                      <a:pPr algn="l" fontAlgn="ctr">
+                        <a:spcBef>
+                          <a:spcPts val="0"/>
+                        </a:spcBef>
+                        <a:spcAft>
+                          <a:spcPts val="0"/>
+                        </a:spcAft>
+                      </a:pPr>
+                      <a:r>
+                        <a:rPr lang="en-IN" sz="2800" b="0" u="none" strike="noStrike">
+                          <a:solidFill>
+                            <a:srgbClr val="000000"/>
+                          </a:solidFill>
+                          <a:effectLst/>
+                        </a:rPr>
+                        <a:t>ng doc</a:t>
+                      </a:r>
+                      <a:endParaRPr lang="en-IN" sz="2800" b="0" i="0" u="none" strike="noStrike">
+                        <a:effectLst/>
+                        <a:latin typeface="Arial" panose="020B0604020202020204" pitchFamily="34" charset="0"/>
+                      </a:endParaRPr>
+                    </a:p>
+                  </a:txBody>
+                  <a:tcPr marL="14226" marR="14226" marT="14226" marB="0" anchor="ctr"/>
+                </a:tc>
+                <a:tc>
+                  <a:txBody>
+                    <a:bodyPr/>
+                    <a:lstStyle/>
+                    <a:p>
+                      <a:pPr algn="l" fontAlgn="ctr">
+                        <a:spcBef>
+                          <a:spcPts val="0"/>
+                        </a:spcBef>
+                        <a:spcAft>
+                          <a:spcPts val="0"/>
+                        </a:spcAft>
+                      </a:pPr>
+                      <a:r>
+                        <a:rPr lang="en-IN" sz="2800" b="0" u="none" strike="noStrike">
+                          <a:solidFill>
+                            <a:srgbClr val="000000"/>
+                          </a:solidFill>
+                          <a:effectLst/>
+                        </a:rPr>
+                        <a:t>ng test</a:t>
+                      </a:r>
+                      <a:endParaRPr lang="en-IN" sz="2800" b="0" i="0" u="none" strike="noStrike">
+                        <a:effectLst/>
+                        <a:latin typeface="Arial" panose="020B0604020202020204" pitchFamily="34" charset="0"/>
+                      </a:endParaRPr>
+                    </a:p>
+                  </a:txBody>
+                  <a:tcPr marL="14226" marR="14226" marT="14226" marB="0" anchor="ctr"/>
+                </a:tc>
+                <a:extLst>
+                  <a:ext uri="{0D108BD9-81ED-4DB2-BD59-A6C34878D82A}">
+                    <a16:rowId xmlns:a16="http://schemas.microsoft.com/office/drawing/2014/main" val="442653746"/>
+                  </a:ext>
+                </a:extLst>
+              </a:tr>
+              <a:tr h="683225">
+                <a:tc>
+                  <a:txBody>
+                    <a:bodyPr/>
+                    <a:lstStyle/>
+                    <a:p>
+                      <a:pPr algn="l" fontAlgn="ctr">
+                        <a:spcBef>
+                          <a:spcPts val="0"/>
+                        </a:spcBef>
+                        <a:spcAft>
+                          <a:spcPts val="0"/>
+                        </a:spcAft>
+                      </a:pPr>
+                      <a:r>
+                        <a:rPr lang="en-IN" sz="2800" b="0" u="none" strike="noStrike">
+                          <a:solidFill>
+                            <a:srgbClr val="000000"/>
+                          </a:solidFill>
+                          <a:effectLst/>
+                        </a:rPr>
+                        <a:t>ng e2e</a:t>
+                      </a:r>
+                      <a:endParaRPr lang="en-IN" sz="2800" b="0" i="0" u="none" strike="noStrike">
+                        <a:effectLst/>
+                        <a:latin typeface="Arial" panose="020B0604020202020204" pitchFamily="34" charset="0"/>
+                      </a:endParaRPr>
+                    </a:p>
+                  </a:txBody>
+                  <a:tcPr marL="14226" marR="14226" marT="14226" marB="0" anchor="ctr"/>
+                </a:tc>
+                <a:tc>
+                  <a:txBody>
+                    <a:bodyPr/>
+                    <a:lstStyle/>
+                    <a:p>
+                      <a:pPr algn="l" fontAlgn="ctr">
+                        <a:spcBef>
+                          <a:spcPts val="0"/>
+                        </a:spcBef>
+                        <a:spcAft>
+                          <a:spcPts val="0"/>
+                        </a:spcAft>
+                      </a:pPr>
+                      <a:r>
+                        <a:rPr lang="en-IN" sz="2800" b="0" u="none" strike="noStrike">
+                          <a:solidFill>
+                            <a:srgbClr val="000000"/>
+                          </a:solidFill>
+                          <a:effectLst/>
+                        </a:rPr>
+                        <a:t>ng update</a:t>
+                      </a:r>
+                      <a:endParaRPr lang="en-IN" sz="2800" b="0" i="0" u="none" strike="noStrike">
+                        <a:effectLst/>
+                        <a:latin typeface="Arial" panose="020B0604020202020204" pitchFamily="34" charset="0"/>
+                      </a:endParaRPr>
+                    </a:p>
+                  </a:txBody>
+                  <a:tcPr marL="14226" marR="14226" marT="14226" marB="0" anchor="ctr"/>
+                </a:tc>
+                <a:extLst>
+                  <a:ext uri="{0D108BD9-81ED-4DB2-BD59-A6C34878D82A}">
+                    <a16:rowId xmlns:a16="http://schemas.microsoft.com/office/drawing/2014/main" val="361215275"/>
+                  </a:ext>
+                </a:extLst>
+              </a:tr>
+              <a:tr h="683225">
+                <a:tc>
+                  <a:txBody>
+                    <a:bodyPr/>
+                    <a:lstStyle/>
+                    <a:p>
+                      <a:pPr algn="l" fontAlgn="ctr">
+                        <a:spcBef>
+                          <a:spcPts val="0"/>
+                        </a:spcBef>
+                        <a:spcAft>
+                          <a:spcPts val="0"/>
+                        </a:spcAft>
+                      </a:pPr>
+                      <a:r>
+                        <a:rPr lang="en-IN" sz="2800" b="0" u="none" strike="noStrike">
+                          <a:solidFill>
+                            <a:srgbClr val="000000"/>
+                          </a:solidFill>
+                          <a:effectLst/>
+                        </a:rPr>
+                        <a:t>ng extract-i18n</a:t>
+                      </a:r>
+                      <a:endParaRPr lang="en-IN" sz="2800" b="0" i="0" u="none" strike="noStrike">
+                        <a:effectLst/>
+                        <a:latin typeface="Arial" panose="020B0604020202020204" pitchFamily="34" charset="0"/>
+                      </a:endParaRPr>
+                    </a:p>
+                  </a:txBody>
+                  <a:tcPr marL="14226" marR="14226" marT="14226" marB="0" anchor="ctr"/>
+                </a:tc>
+                <a:tc>
+                  <a:txBody>
+                    <a:bodyPr/>
+                    <a:lstStyle/>
+                    <a:p>
+                      <a:pPr algn="l" fontAlgn="ctr">
+                        <a:spcBef>
+                          <a:spcPts val="0"/>
+                        </a:spcBef>
+                        <a:spcAft>
+                          <a:spcPts val="0"/>
+                        </a:spcAft>
+                      </a:pPr>
+                      <a:r>
+                        <a:rPr lang="en-IN" sz="2800" b="1" u="none" strike="noStrike" dirty="0">
+                          <a:solidFill>
+                            <a:srgbClr val="000000"/>
+                          </a:solidFill>
+                          <a:effectLst/>
+                        </a:rPr>
+                        <a:t>ng version</a:t>
+                      </a:r>
+                      <a:endParaRPr lang="en-IN" sz="2800" b="1" i="0" u="none" strike="noStrike" dirty="0">
+                        <a:effectLst/>
+                        <a:latin typeface="Arial" panose="020B0604020202020204" pitchFamily="34" charset="0"/>
+                      </a:endParaRPr>
+                    </a:p>
+                  </a:txBody>
+                  <a:tcPr marL="14226" marR="14226" marT="14226" marB="0" anchor="ctr"/>
+                </a:tc>
+                <a:extLst>
+                  <a:ext uri="{0D108BD9-81ED-4DB2-BD59-A6C34878D82A}">
+                    <a16:rowId xmlns:a16="http://schemas.microsoft.com/office/drawing/2014/main" val="3594076237"/>
+                  </a:ext>
+                </a:extLst>
+              </a:tr>
+              <a:tr h="683225">
+                <a:tc>
+                  <a:txBody>
+                    <a:bodyPr/>
+                    <a:lstStyle/>
+                    <a:p>
+                      <a:pPr algn="l" fontAlgn="ctr">
+                        <a:spcBef>
+                          <a:spcPts val="0"/>
+                        </a:spcBef>
+                        <a:spcAft>
+                          <a:spcPts val="0"/>
+                        </a:spcAft>
+                      </a:pPr>
+                      <a:r>
+                        <a:rPr lang="en-IN" sz="2800" b="0" u="none" strike="noStrike">
+                          <a:solidFill>
+                            <a:srgbClr val="000000"/>
+                          </a:solidFill>
+                          <a:effectLst/>
+                        </a:rPr>
+                        <a:t>ng generate</a:t>
+                      </a:r>
+                      <a:endParaRPr lang="en-IN" sz="2800" b="0" i="0" u="none" strike="noStrike">
+                        <a:effectLst/>
+                        <a:latin typeface="Arial" panose="020B0604020202020204" pitchFamily="34" charset="0"/>
+                      </a:endParaRPr>
+                    </a:p>
+                  </a:txBody>
+                  <a:tcPr marL="14226" marR="14226" marT="14226" marB="0" anchor="ctr"/>
+                </a:tc>
+                <a:tc>
+                  <a:txBody>
+                    <a:bodyPr/>
+                    <a:lstStyle/>
+                    <a:p>
+                      <a:pPr algn="l" fontAlgn="b">
+                        <a:spcBef>
+                          <a:spcPts val="0"/>
+                        </a:spcBef>
+                        <a:spcAft>
+                          <a:spcPts val="0"/>
+                        </a:spcAft>
+                      </a:pPr>
+                      <a:endParaRPr lang="en-IN" sz="2800" b="0" i="0" u="none" strike="noStrike" dirty="0">
+                        <a:effectLst/>
+                        <a:latin typeface="Arial" panose="020B0604020202020204" pitchFamily="34" charset="0"/>
+                      </a:endParaRPr>
+                    </a:p>
+                  </a:txBody>
+                  <a:tcPr marL="14226" marR="14226" marT="14226" marB="0" anchor="b"/>
+                </a:tc>
+                <a:extLst>
+                  <a:ext uri="{0D108BD9-81ED-4DB2-BD59-A6C34878D82A}">
+                    <a16:rowId xmlns:a16="http://schemas.microsoft.com/office/drawing/2014/main" val="344538591"/>
+                  </a:ext>
+                </a:extLst>
+              </a:tr>
+            </a:tbl>
+          </a:graphicData>
+        </a:graphic>
+      </p:graphicFrame>
+    </p:spTree>
+    <p:extLst>
+      <p:ext uri="{BB962C8B-B14F-4D97-AF65-F5344CB8AC3E}">
+        <p14:creationId xmlns:p14="http://schemas.microsoft.com/office/powerpoint/2010/main" val="1828995850"/>
+      </p:ext>
+    </p:extLst>
+  </p:cSld>
+  <p:clrMapOvr>
+    <a:masterClrMapping/>
+  </p:clrMapOvr>
+</p:sld>
+</file>
+
+<file path=ppt/slides/slide83.xml><?xml version="1.0" encoding="utf-8"?>
+<p:sld xmlns:a="http://schemas.openxmlformats.org/drawingml/2006/main" xmlns:r="http://schemas.openxmlformats.org/officeDocument/2006/relationships" xmlns:p="http://schemas.openxmlformats.org/presentationml/2006/main">
+  <p:cSld>
+    <p:spTree>
+      <p:nvGrpSpPr>
+        <p:cNvPr id="1" name=""/>
+        <p:cNvGrpSpPr/>
+        <p:nvPr/>
+      </p:nvGrpSpPr>
+      <p:grpSpPr>
+        <a:xfrm>
+          <a:off x="0" y="0"/>
+          <a:ext cx="0" cy="0"/>
+          <a:chOff x="0" y="0"/>
+          <a:chExt cx="0" cy="0"/>
+        </a:xfrm>
+      </p:grpSpPr>
+      <p:sp>
+        <p:nvSpPr>
+          <p:cNvPr id="2" name="Title 1">
+            <a:extLst>
+              <a:ext uri="{FF2B5EF4-FFF2-40B4-BE49-F238E27FC236}">
+                <a16:creationId xmlns:a16="http://schemas.microsoft.com/office/drawing/2014/main" id="{CB623149-3569-BAB2-2EA6-BF45FAFBFB1E}"/>
+              </a:ext>
+            </a:extLst>
+          </p:cNvPr>
+          <p:cNvSpPr>
+            <a:spLocks noGrp="1"/>
+          </p:cNvSpPr>
+          <p:nvPr>
+            <p:ph type="title"/>
+          </p:nvPr>
+        </p:nvSpPr>
+        <p:spPr/>
+        <p:txBody>
+          <a:bodyPr/>
+          <a:lstStyle/>
+          <a:p>
+            <a:r>
+              <a:rPr lang="en-IN"/>
+              <a:t>Terminologies</a:t>
+            </a:r>
+          </a:p>
+        </p:txBody>
+      </p:sp>
+      <p:sp>
+        <p:nvSpPr>
+          <p:cNvPr id="3" name="Content Placeholder 2">
+            <a:extLst>
+              <a:ext uri="{FF2B5EF4-FFF2-40B4-BE49-F238E27FC236}">
+                <a16:creationId xmlns:a16="http://schemas.microsoft.com/office/drawing/2014/main" id="{20E8DDF9-D7ED-BF66-77BF-F6FA77065779}"/>
+              </a:ext>
+            </a:extLst>
+          </p:cNvPr>
+          <p:cNvSpPr>
+            <a:spLocks noGrp="1"/>
+          </p:cNvSpPr>
+          <p:nvPr>
+            <p:ph idx="1"/>
+          </p:nvPr>
+        </p:nvSpPr>
+        <p:spPr/>
+        <p:txBody>
+          <a:bodyPr>
+            <a:normAutofit lnSpcReduction="10000"/>
+          </a:bodyPr>
+          <a:lstStyle/>
+          <a:p>
+            <a:r>
+              <a:rPr lang="en-IN"/>
+              <a:t>Angular Workspace</a:t>
+            </a:r>
+          </a:p>
+          <a:p>
+            <a:pPr lvl="1"/>
+            <a:r>
+              <a:rPr lang="en-US"/>
+              <a:t>A workspace is a collection of different projects. The ng new command creates a new workspace.</a:t>
+            </a:r>
+          </a:p>
+          <a:p>
+            <a:r>
+              <a:rPr lang="en-US"/>
+              <a:t>Angular Projects</a:t>
+            </a:r>
+          </a:p>
+          <a:p>
+            <a:pPr lvl="1"/>
+            <a:r>
+              <a:rPr lang="en-IN"/>
+              <a:t>Angular Library</a:t>
+            </a:r>
+          </a:p>
+          <a:p>
+            <a:pPr lvl="2"/>
+            <a:r>
+              <a:rPr lang="en-US"/>
+              <a:t>A library is a collection of components, services, directives etc. that can be shared across different Angular projects.</a:t>
+            </a:r>
+          </a:p>
+          <a:p>
+            <a:pPr lvl="2"/>
+            <a:r>
+              <a:rPr lang="en-US"/>
+              <a:t>A library can be packaged and published</a:t>
+            </a:r>
+            <a:endParaRPr lang="en-IN"/>
+          </a:p>
+          <a:p>
+            <a:pPr lvl="1"/>
+            <a:r>
+              <a:rPr lang="en-IN"/>
+              <a:t>Angular Application</a:t>
+            </a:r>
+          </a:p>
+          <a:p>
+            <a:pPr lvl="2"/>
+            <a:r>
+              <a:rPr lang="en-US"/>
+              <a:t>An application is a collection of components, services, directives etc. that can be served as an output.</a:t>
+            </a:r>
+          </a:p>
+          <a:p>
+            <a:pPr lvl="2"/>
+            <a:r>
+              <a:rPr lang="en-US"/>
+              <a:t>An application can be built and deployed.</a:t>
+            </a:r>
+            <a:endParaRPr lang="en-IN"/>
+          </a:p>
+          <a:p>
+            <a:pPr lvl="2"/>
+            <a:endParaRPr lang="en-IN"/>
+          </a:p>
+        </p:txBody>
+      </p:sp>
+    </p:spTree>
+    <p:extLst>
+      <p:ext uri="{BB962C8B-B14F-4D97-AF65-F5344CB8AC3E}">
+        <p14:creationId xmlns:p14="http://schemas.microsoft.com/office/powerpoint/2010/main" val="3298109447"/>
+      </p:ext>
+    </p:extLst>
+  </p:cSld>
+  <p:clrMapOvr>
+    <a:masterClrMapping/>
+  </p:clrMapOvr>
+</p:sld>
+</file>
+
+<file path=ppt/slides/slide84.xml><?xml version="1.0" encoding="utf-8"?>
+<p:sld xmlns:a="http://schemas.openxmlformats.org/drawingml/2006/main" xmlns:r="http://schemas.openxmlformats.org/officeDocument/2006/relationships" xmlns:p="http://schemas.openxmlformats.org/presentationml/2006/main">
+  <p:cSld>
+    <p:spTree>
+      <p:nvGrpSpPr>
+        <p:cNvPr id="1" name=""/>
+        <p:cNvGrpSpPr/>
+        <p:nvPr/>
+      </p:nvGrpSpPr>
+      <p:grpSpPr>
+        <a:xfrm>
+          <a:off x="0" y="0"/>
+          <a:ext cx="0" cy="0"/>
+          <a:chOff x="0" y="0"/>
+          <a:chExt cx="0" cy="0"/>
+        </a:xfrm>
+      </p:grpSpPr>
+      <p:sp>
+        <p:nvSpPr>
+          <p:cNvPr id="2" name="Title 1">
+            <a:extLst>
+              <a:ext uri="{FF2B5EF4-FFF2-40B4-BE49-F238E27FC236}">
+                <a16:creationId xmlns:a16="http://schemas.microsoft.com/office/drawing/2014/main" id="{D34A3DE0-5B11-4A18-9368-A97790F6B4D4}"/>
+              </a:ext>
+            </a:extLst>
+          </p:cNvPr>
+          <p:cNvSpPr>
+            <a:spLocks noGrp="1"/>
+          </p:cNvSpPr>
+          <p:nvPr>
+            <p:ph type="title"/>
+          </p:nvPr>
+        </p:nvSpPr>
+        <p:spPr/>
+        <p:txBody>
+          <a:bodyPr/>
+          <a:lstStyle/>
+          <a:p>
+            <a:r>
+              <a:rPr lang="en-US"/>
+              <a:t>Creating Application</a:t>
+            </a:r>
+          </a:p>
+        </p:txBody>
+      </p:sp>
+      <p:sp>
+        <p:nvSpPr>
+          <p:cNvPr id="3" name="Content Placeholder 2">
+            <a:extLst>
+              <a:ext uri="{FF2B5EF4-FFF2-40B4-BE49-F238E27FC236}">
+                <a16:creationId xmlns:a16="http://schemas.microsoft.com/office/drawing/2014/main" id="{DB4144A5-1FEA-4E7F-966B-484A5CEC69D9}"/>
+              </a:ext>
+            </a:extLst>
+          </p:cNvPr>
+          <p:cNvSpPr>
+            <a:spLocks noGrp="1"/>
+          </p:cNvSpPr>
+          <p:nvPr>
+            <p:ph idx="1"/>
+          </p:nvPr>
+        </p:nvSpPr>
+        <p:spPr/>
+        <p:txBody>
+          <a:bodyPr/>
+          <a:lstStyle/>
+          <a:p>
+            <a:r>
+              <a:rPr lang="en-US" dirty="0"/>
+              <a:t>Single Project in Single Workspace</a:t>
+            </a:r>
+          </a:p>
+          <a:p>
+            <a:pPr lvl="1"/>
+            <a:r>
+              <a:rPr lang="en-US" dirty="0"/>
+              <a:t>ng new &lt;app-name&gt;</a:t>
+            </a:r>
+          </a:p>
+          <a:p>
+            <a:r>
+              <a:rPr lang="en-US" dirty="0"/>
+              <a:t>Run the Application</a:t>
+            </a:r>
+          </a:p>
+          <a:p>
+            <a:pPr lvl="1"/>
+            <a:r>
+              <a:rPr lang="en-US" dirty="0"/>
+              <a:t>ng serve – This command will run the project in development</a:t>
+            </a:r>
+          </a:p>
+          <a:p>
+            <a:pPr lvl="1"/>
+            <a:r>
+              <a:rPr lang="en-US" dirty="0"/>
+              <a:t>ng build – This command will create the production build</a:t>
+            </a:r>
+          </a:p>
+          <a:p>
+            <a:pPr lvl="1"/>
+            <a:r>
+              <a:rPr lang="en-US" dirty="0"/>
+              <a:t>ng test – This command will run the jasmine tests</a:t>
+            </a:r>
+          </a:p>
+        </p:txBody>
+      </p:sp>
+    </p:spTree>
+    <p:extLst>
+      <p:ext uri="{BB962C8B-B14F-4D97-AF65-F5344CB8AC3E}">
+        <p14:creationId xmlns:p14="http://schemas.microsoft.com/office/powerpoint/2010/main" val="1122893291"/>
+      </p:ext>
+    </p:extLst>
+  </p:cSld>
+  <p:clrMapOvr>
+    <a:masterClrMapping/>
+  </p:clrMapOvr>
+</p:sld>
+</file>
+
+<file path=ppt/slides/slide85.xml><?xml version="1.0" encoding="utf-8"?>
+<p:sld xmlns:a="http://schemas.openxmlformats.org/drawingml/2006/main" xmlns:r="http://schemas.openxmlformats.org/officeDocument/2006/relationships" xmlns:p="http://schemas.openxmlformats.org/presentationml/2006/main">
+  <p:cSld>
+    <p:spTree>
+      <p:nvGrpSpPr>
+        <p:cNvPr id="1" name=""/>
+        <p:cNvGrpSpPr/>
+        <p:nvPr/>
+      </p:nvGrpSpPr>
+      <p:grpSpPr>
+        <a:xfrm>
+          <a:off x="0" y="0"/>
+          <a:ext cx="0" cy="0"/>
+          <a:chOff x="0" y="0"/>
+          <a:chExt cx="0" cy="0"/>
+        </a:xfrm>
+      </p:grpSpPr>
+      <p:sp>
+        <p:nvSpPr>
+          <p:cNvPr id="2" name="Title 1">
+            <a:extLst>
+              <a:ext uri="{FF2B5EF4-FFF2-40B4-BE49-F238E27FC236}">
+                <a16:creationId xmlns:a16="http://schemas.microsoft.com/office/drawing/2014/main" id="{D34A3DE0-5B11-4A18-9368-A97790F6B4D4}"/>
+              </a:ext>
+            </a:extLst>
+          </p:cNvPr>
+          <p:cNvSpPr>
+            <a:spLocks noGrp="1"/>
+          </p:cNvSpPr>
+          <p:nvPr>
+            <p:ph type="title"/>
+          </p:nvPr>
+        </p:nvSpPr>
+        <p:spPr/>
+        <p:txBody>
+          <a:bodyPr/>
+          <a:lstStyle/>
+          <a:p>
+            <a:r>
+              <a:rPr lang="en-US"/>
+              <a:t>Creating Application</a:t>
+            </a:r>
+          </a:p>
+        </p:txBody>
+      </p:sp>
+      <p:sp>
+        <p:nvSpPr>
+          <p:cNvPr id="3" name="Content Placeholder 2">
+            <a:extLst>
+              <a:ext uri="{FF2B5EF4-FFF2-40B4-BE49-F238E27FC236}">
+                <a16:creationId xmlns:a16="http://schemas.microsoft.com/office/drawing/2014/main" id="{DB4144A5-1FEA-4E7F-966B-484A5CEC69D9}"/>
+              </a:ext>
+            </a:extLst>
+          </p:cNvPr>
+          <p:cNvSpPr>
+            <a:spLocks noGrp="1"/>
+          </p:cNvSpPr>
+          <p:nvPr>
+            <p:ph idx="1"/>
+          </p:nvPr>
+        </p:nvSpPr>
+        <p:spPr/>
+        <p:txBody>
+          <a:bodyPr vert="horz" lIns="91440" tIns="45720" rIns="91440" bIns="45720" rtlCol="0" anchor="t">
+            <a:normAutofit/>
+          </a:bodyPr>
+          <a:lstStyle/>
+          <a:p>
+            <a:r>
+              <a:rPr lang="en-US" dirty="0"/>
+              <a:t>Multiple Projects in Single Workspace</a:t>
+            </a:r>
+          </a:p>
+          <a:p>
+            <a:pPr lvl="1"/>
+            <a:r>
+              <a:rPr lang="en-US" dirty="0"/>
+              <a:t>ng new multi-apps --create-application=“false”</a:t>
+            </a:r>
+            <a:endParaRPr lang="en-US" dirty="0">
+              <a:cs typeface="Calibri"/>
+            </a:endParaRPr>
+          </a:p>
+          <a:p>
+            <a:pPr lvl="1"/>
+            <a:r>
+              <a:rPr lang="en-US" dirty="0"/>
+              <a:t>cd multi-apps</a:t>
+            </a:r>
+            <a:endParaRPr lang="en-US" dirty="0">
+              <a:cs typeface="Calibri"/>
+            </a:endParaRPr>
+          </a:p>
+          <a:p>
+            <a:pPr lvl="1"/>
+            <a:r>
+              <a:rPr lang="en-US" dirty="0"/>
+              <a:t>ng generate application app-one</a:t>
+            </a:r>
+            <a:endParaRPr lang="en-US" dirty="0">
+              <a:cs typeface="Calibri"/>
+            </a:endParaRPr>
+          </a:p>
+          <a:p>
+            <a:pPr lvl="1"/>
+            <a:r>
+              <a:rPr lang="en-US" dirty="0"/>
+              <a:t>ng generate application app-two</a:t>
+            </a:r>
+            <a:endParaRPr lang="en-US" dirty="0">
+              <a:cs typeface="Calibri"/>
+            </a:endParaRPr>
+          </a:p>
+          <a:p>
+            <a:pPr lvl="1"/>
+            <a:r>
+              <a:rPr lang="en-US" dirty="0"/>
+              <a:t>ng generate library my-lib</a:t>
+            </a:r>
+            <a:endParaRPr lang="en-US" dirty="0">
+              <a:cs typeface="Calibri"/>
+            </a:endParaRPr>
+          </a:p>
+          <a:p>
+            <a:r>
+              <a:rPr lang="en-US" dirty="0"/>
+              <a:t>Run the Application</a:t>
+            </a:r>
+            <a:endParaRPr lang="en-US" dirty="0">
+              <a:cs typeface="Calibri"/>
+            </a:endParaRPr>
+          </a:p>
+          <a:p>
+            <a:pPr lvl="1"/>
+            <a:r>
+              <a:rPr lang="en-US" dirty="0"/>
+              <a:t>ng serve --project=app-one – This command will run the application project in development named app-one</a:t>
+            </a:r>
+            <a:endParaRPr lang="en-US" dirty="0">
+              <a:cs typeface="Calibri"/>
+            </a:endParaRPr>
+          </a:p>
+          <a:p>
+            <a:pPr lvl="1"/>
+            <a:r>
+              <a:rPr lang="en-US" dirty="0"/>
+              <a:t>Only project of type application will be served</a:t>
+            </a:r>
+            <a:endParaRPr lang="en-US" dirty="0">
+              <a:cs typeface="Calibri"/>
+            </a:endParaRPr>
+          </a:p>
+        </p:txBody>
+      </p:sp>
+    </p:spTree>
+    <p:extLst>
+      <p:ext uri="{BB962C8B-B14F-4D97-AF65-F5344CB8AC3E}">
+        <p14:creationId xmlns:p14="http://schemas.microsoft.com/office/powerpoint/2010/main" val="1490411443"/>
+      </p:ext>
+    </p:extLst>
+  </p:cSld>
+  <p:clrMapOvr>
+    <a:masterClrMapping/>
+  </p:clrMapOvr>
+</p:sld>
+</file>
+
+<file path=ppt/slides/slide86.xml><?xml version="1.0" encoding="utf-8"?>
+<p:sld xmlns:a="http://schemas.openxmlformats.org/drawingml/2006/main" xmlns:r="http://schemas.openxmlformats.org/officeDocument/2006/relationships" xmlns:p="http://schemas.openxmlformats.org/presentationml/2006/main">
+  <p:cSld>
+    <p:spTree>
+      <p:nvGrpSpPr>
+        <p:cNvPr id="1" name=""/>
+        <p:cNvGrpSpPr/>
+        <p:nvPr/>
+      </p:nvGrpSpPr>
+      <p:grpSpPr>
+        <a:xfrm>
+          <a:off x="0" y="0"/>
+          <a:ext cx="0" cy="0"/>
+          <a:chOff x="0" y="0"/>
+          <a:chExt cx="0" cy="0"/>
+        </a:xfrm>
+      </p:grpSpPr>
+      <p:sp>
+        <p:nvSpPr>
+          <p:cNvPr id="2" name="Title 1">
+            <a:extLst>
+              <a:ext uri="{FF2B5EF4-FFF2-40B4-BE49-F238E27FC236}">
+                <a16:creationId xmlns:a16="http://schemas.microsoft.com/office/drawing/2014/main" id="{D4872C39-BF38-48DF-B1FD-09336D98B099}"/>
+              </a:ext>
+            </a:extLst>
+          </p:cNvPr>
+          <p:cNvSpPr>
+            <a:spLocks noGrp="1"/>
+          </p:cNvSpPr>
+          <p:nvPr>
+            <p:ph type="title"/>
+          </p:nvPr>
+        </p:nvSpPr>
+        <p:spPr/>
+        <p:txBody>
+          <a:bodyPr/>
+          <a:lstStyle/>
+          <a:p>
+            <a:r>
+              <a:rPr lang="en-IN"/>
+              <a:t>ng generate</a:t>
+            </a:r>
+          </a:p>
+        </p:txBody>
+      </p:sp>
+      <p:sp>
+        <p:nvSpPr>
+          <p:cNvPr id="3" name="Content Placeholder 2">
+            <a:extLst>
+              <a:ext uri="{FF2B5EF4-FFF2-40B4-BE49-F238E27FC236}">
+                <a16:creationId xmlns:a16="http://schemas.microsoft.com/office/drawing/2014/main" id="{CA089637-47F8-45CE-B796-37BE991E3843}"/>
+              </a:ext>
+            </a:extLst>
+          </p:cNvPr>
+          <p:cNvSpPr>
+            <a:spLocks noGrp="1"/>
+          </p:cNvSpPr>
+          <p:nvPr>
+            <p:ph idx="1"/>
+          </p:nvPr>
+        </p:nvSpPr>
+        <p:spPr/>
+        <p:txBody>
+          <a:bodyPr>
+            <a:normAutofit/>
+          </a:bodyPr>
+          <a:lstStyle/>
+          <a:p>
+            <a:r>
+              <a:rPr lang="en-US" dirty="0"/>
+              <a:t>Generates and/or modifies files based on a schematic.</a:t>
+            </a:r>
+          </a:p>
+          <a:p>
+            <a:pPr lvl="1"/>
+            <a:r>
+              <a:rPr lang="en-US" dirty="0"/>
+              <a:t>ng generate &lt;schematic&gt; [options]</a:t>
+            </a:r>
+          </a:p>
+          <a:p>
+            <a:pPr lvl="1"/>
+            <a:r>
+              <a:rPr lang="en-US" dirty="0"/>
+              <a:t>ng g &lt;schematic&gt; [options]</a:t>
+            </a:r>
+          </a:p>
+          <a:p>
+            <a:pPr lvl="1"/>
+            <a:r>
+              <a:rPr lang="en-US" dirty="0">
+                <a:hlinkClick r:id="rId2"/>
+              </a:rPr>
+              <a:t>https://angular.io/cli/generate</a:t>
+            </a:r>
+            <a:endParaRPr lang="en-US" dirty="0"/>
+          </a:p>
+          <a:p>
+            <a:r>
+              <a:rPr lang="en-US" dirty="0"/>
+              <a:t>Schematic</a:t>
+            </a:r>
+          </a:p>
+        </p:txBody>
+      </p:sp>
+      <p:graphicFrame>
+        <p:nvGraphicFramePr>
+          <p:cNvPr id="6" name="Table 6">
+            <a:extLst>
+              <a:ext uri="{FF2B5EF4-FFF2-40B4-BE49-F238E27FC236}">
+                <a16:creationId xmlns:a16="http://schemas.microsoft.com/office/drawing/2014/main" id="{445172B5-3A11-4284-A852-7B63E64E47F6}"/>
+              </a:ext>
+            </a:extLst>
+          </p:cNvPr>
+          <p:cNvGraphicFramePr>
+            <a:graphicFrameLocks noGrp="1"/>
+          </p:cNvGraphicFramePr>
+          <p:nvPr/>
+        </p:nvGraphicFramePr>
+        <p:xfrm>
+          <a:off x="1180829" y="4003727"/>
+          <a:ext cx="9923296" cy="2008944"/>
+        </p:xfrm>
+        <a:graphic>
+          <a:graphicData uri="http://schemas.openxmlformats.org/drawingml/2006/table">
+            <a:tbl>
+              <a:tblPr firstRow="1" bandRow="1">
+                <a:tableStyleId>{0505E3EF-67EA-436B-97B2-0124C06EBD24}</a:tableStyleId>
+              </a:tblPr>
+              <a:tblGrid>
+                <a:gridCol w="2480824">
+                  <a:extLst>
+                    <a:ext uri="{9D8B030D-6E8A-4147-A177-3AD203B41FA5}">
+                      <a16:colId xmlns:a16="http://schemas.microsoft.com/office/drawing/2014/main" val="35834621"/>
+                    </a:ext>
+                  </a:extLst>
+                </a:gridCol>
+                <a:gridCol w="2480824">
+                  <a:extLst>
+                    <a:ext uri="{9D8B030D-6E8A-4147-A177-3AD203B41FA5}">
+                      <a16:colId xmlns:a16="http://schemas.microsoft.com/office/drawing/2014/main" val="3804257837"/>
+                    </a:ext>
+                  </a:extLst>
+                </a:gridCol>
+                <a:gridCol w="2480824">
+                  <a:extLst>
+                    <a:ext uri="{9D8B030D-6E8A-4147-A177-3AD203B41FA5}">
+                      <a16:colId xmlns:a16="http://schemas.microsoft.com/office/drawing/2014/main" val="1849735432"/>
+                    </a:ext>
+                  </a:extLst>
+                </a:gridCol>
+                <a:gridCol w="2480824">
+                  <a:extLst>
+                    <a:ext uri="{9D8B030D-6E8A-4147-A177-3AD203B41FA5}">
+                      <a16:colId xmlns:a16="http://schemas.microsoft.com/office/drawing/2014/main" val="2258174611"/>
+                    </a:ext>
+                  </a:extLst>
+                </a:gridCol>
+              </a:tblGrid>
+              <a:tr h="502236">
+                <a:tc>
+                  <a:txBody>
+                    <a:bodyPr/>
+                    <a:lstStyle/>
+                    <a:p>
+                      <a:pPr algn="l"/>
+                      <a:r>
+                        <a:rPr lang="en-IN" sz="2400" b="0"/>
+                        <a:t>app-shell</a:t>
+                      </a:r>
+                    </a:p>
+                  </a:txBody>
+                  <a:tcPr anchor="ctr"/>
+                </a:tc>
+                <a:tc>
+                  <a:txBody>
+                    <a:bodyPr/>
+                    <a:lstStyle/>
+                    <a:p>
+                      <a:pPr algn="l"/>
+                      <a:r>
+                        <a:rPr lang="en-IN" sz="2400" b="0"/>
+                        <a:t>directive</a:t>
+                      </a:r>
+                    </a:p>
+                  </a:txBody>
+                  <a:tcPr anchor="ctr"/>
+                </a:tc>
+                <a:tc>
+                  <a:txBody>
+                    <a:bodyPr/>
+                    <a:lstStyle/>
+                    <a:p>
+                      <a:pPr algn="l"/>
+                      <a:r>
+                        <a:rPr lang="en-IN" sz="2400" b="0"/>
+                        <a:t>interface</a:t>
+                      </a:r>
+                    </a:p>
+                  </a:txBody>
+                  <a:tcPr anchor="ctr"/>
+                </a:tc>
+                <a:tc>
+                  <a:txBody>
+                    <a:bodyPr/>
+                    <a:lstStyle/>
+                    <a:p>
+                      <a:pPr algn="l"/>
+                      <a:r>
+                        <a:rPr lang="en-IN" sz="2400" b="0"/>
+                        <a:t>resolver</a:t>
+                      </a:r>
+                    </a:p>
+                  </a:txBody>
+                  <a:tcPr anchor="ctr"/>
+                </a:tc>
+                <a:extLst>
+                  <a:ext uri="{0D108BD9-81ED-4DB2-BD59-A6C34878D82A}">
+                    <a16:rowId xmlns:a16="http://schemas.microsoft.com/office/drawing/2014/main" val="1721436120"/>
+                  </a:ext>
+                </a:extLst>
+              </a:tr>
+              <a:tr h="502236">
+                <a:tc>
+                  <a:txBody>
+                    <a:bodyPr/>
+                    <a:lstStyle/>
+                    <a:p>
+                      <a:pPr algn="l"/>
+                      <a:r>
+                        <a:rPr lang="en-IN" sz="2400" b="1"/>
+                        <a:t>application</a:t>
+                      </a:r>
+                    </a:p>
+                  </a:txBody>
+                  <a:tcPr anchor="ctr"/>
+                </a:tc>
+                <a:tc>
+                  <a:txBody>
+                    <a:bodyPr/>
+                    <a:lstStyle/>
+                    <a:p>
+                      <a:pPr algn="l"/>
+                      <a:r>
+                        <a:rPr lang="en-IN" sz="2400" b="0" err="1"/>
+                        <a:t>enum</a:t>
+                      </a:r>
+                      <a:endParaRPr lang="en-IN" sz="2400" b="0"/>
+                    </a:p>
+                  </a:txBody>
+                  <a:tcPr anchor="ctr"/>
+                </a:tc>
+                <a:tc>
+                  <a:txBody>
+                    <a:bodyPr/>
+                    <a:lstStyle/>
+                    <a:p>
+                      <a:pPr algn="l"/>
+                      <a:r>
+                        <a:rPr lang="en-IN" sz="2400" b="1"/>
+                        <a:t>library</a:t>
+                      </a:r>
+                    </a:p>
+                  </a:txBody>
+                  <a:tcPr anchor="ctr"/>
+                </a:tc>
+                <a:tc>
+                  <a:txBody>
+                    <a:bodyPr/>
+                    <a:lstStyle/>
+                    <a:p>
+                      <a:pPr algn="l"/>
+                      <a:r>
+                        <a:rPr lang="en-IN" sz="2400" b="0"/>
+                        <a:t>service</a:t>
+                      </a:r>
+                    </a:p>
+                  </a:txBody>
+                  <a:tcPr anchor="ctr"/>
+                </a:tc>
+                <a:extLst>
+                  <a:ext uri="{0D108BD9-81ED-4DB2-BD59-A6C34878D82A}">
+                    <a16:rowId xmlns:a16="http://schemas.microsoft.com/office/drawing/2014/main" val="1510157445"/>
+                  </a:ext>
+                </a:extLst>
+              </a:tr>
+              <a:tr h="502236">
+                <a:tc>
+                  <a:txBody>
+                    <a:bodyPr/>
+                    <a:lstStyle/>
+                    <a:p>
+                      <a:pPr algn="l"/>
+                      <a:r>
+                        <a:rPr lang="en-IN" sz="2400" b="0"/>
+                        <a:t>class</a:t>
+                      </a:r>
+                    </a:p>
+                  </a:txBody>
+                  <a:tcPr anchor="ctr"/>
+                </a:tc>
+                <a:tc>
+                  <a:txBody>
+                    <a:bodyPr/>
+                    <a:lstStyle/>
+                    <a:p>
+                      <a:pPr algn="l"/>
+                      <a:r>
+                        <a:rPr lang="en-IN" sz="2400" b="0"/>
+                        <a:t>guard</a:t>
+                      </a:r>
+                    </a:p>
+                  </a:txBody>
+                  <a:tcPr anchor="ctr"/>
+                </a:tc>
+                <a:tc>
+                  <a:txBody>
+                    <a:bodyPr/>
+                    <a:lstStyle/>
+                    <a:p>
+                      <a:pPr algn="l"/>
+                      <a:r>
+                        <a:rPr lang="en-IN" sz="2400" b="0"/>
+                        <a:t>module</a:t>
+                      </a:r>
+                    </a:p>
+                  </a:txBody>
+                  <a:tcPr anchor="ctr"/>
+                </a:tc>
+                <a:tc>
+                  <a:txBody>
+                    <a:bodyPr/>
+                    <a:lstStyle/>
+                    <a:p>
+                      <a:pPr algn="l"/>
+                      <a:r>
+                        <a:rPr lang="en-IN" sz="2400" b="0"/>
+                        <a:t>service-worker</a:t>
+                      </a:r>
+                    </a:p>
+                  </a:txBody>
+                  <a:tcPr anchor="ctr"/>
+                </a:tc>
+                <a:extLst>
+                  <a:ext uri="{0D108BD9-81ED-4DB2-BD59-A6C34878D82A}">
+                    <a16:rowId xmlns:a16="http://schemas.microsoft.com/office/drawing/2014/main" val="2919183382"/>
+                  </a:ext>
+                </a:extLst>
+              </a:tr>
+              <a:tr h="502236">
+                <a:tc>
+                  <a:txBody>
+                    <a:bodyPr/>
+                    <a:lstStyle/>
+                    <a:p>
+                      <a:pPr algn="l"/>
+                      <a:r>
+                        <a:rPr lang="en-IN" sz="2400" b="0"/>
+                        <a:t>component</a:t>
+                      </a:r>
+                    </a:p>
+                  </a:txBody>
+                  <a:tcPr anchor="ctr"/>
+                </a:tc>
+                <a:tc>
+                  <a:txBody>
+                    <a:bodyPr/>
+                    <a:lstStyle/>
+                    <a:p>
+                      <a:pPr algn="l"/>
+                      <a:r>
+                        <a:rPr lang="en-IN" sz="2400" b="0"/>
+                        <a:t>interceptor</a:t>
+                      </a:r>
+                    </a:p>
+                  </a:txBody>
+                  <a:tcPr anchor="ctr"/>
+                </a:tc>
+                <a:tc>
+                  <a:txBody>
+                    <a:bodyPr/>
+                    <a:lstStyle/>
+                    <a:p>
+                      <a:pPr algn="l"/>
+                      <a:r>
+                        <a:rPr lang="en-IN" sz="2400" b="0"/>
+                        <a:t>pipe</a:t>
+                      </a:r>
+                    </a:p>
+                  </a:txBody>
+                  <a:tcPr anchor="ctr"/>
+                </a:tc>
+                <a:tc>
+                  <a:txBody>
+                    <a:bodyPr/>
+                    <a:lstStyle/>
+                    <a:p>
+                      <a:pPr algn="l"/>
+                      <a:r>
+                        <a:rPr lang="en-IN" sz="2400" b="0"/>
+                        <a:t>web-worker</a:t>
+                      </a:r>
+                    </a:p>
+                  </a:txBody>
+                  <a:tcPr anchor="ctr"/>
+                </a:tc>
+                <a:extLst>
+                  <a:ext uri="{0D108BD9-81ED-4DB2-BD59-A6C34878D82A}">
+                    <a16:rowId xmlns:a16="http://schemas.microsoft.com/office/drawing/2014/main" val="2288129455"/>
+                  </a:ext>
+                </a:extLst>
+              </a:tr>
+            </a:tbl>
+          </a:graphicData>
+        </a:graphic>
+      </p:graphicFrame>
+    </p:spTree>
+    <p:extLst>
+      <p:ext uri="{BB962C8B-B14F-4D97-AF65-F5344CB8AC3E}">
+        <p14:creationId xmlns:p14="http://schemas.microsoft.com/office/powerpoint/2010/main" val="2868707546"/>
+      </p:ext>
+    </p:extLst>
+  </p:cSld>
+  <p:clrMapOvr>
+    <a:masterClrMapping/>
+  </p:clrMapOvr>
+</p:sld>
+</file>
+
+<file path=ppt/slides/slide87.xml><?xml version="1.0" encoding="utf-8"?>
+<p:sld xmlns:a="http://schemas.openxmlformats.org/drawingml/2006/main" xmlns:r="http://schemas.openxmlformats.org/officeDocument/2006/relationships" xmlns:p="http://schemas.openxmlformats.org/presentationml/2006/main">
+  <p:cSld>
+    <p:spTree>
+      <p:nvGrpSpPr>
+        <p:cNvPr id="1" name=""/>
+        <p:cNvGrpSpPr/>
+        <p:nvPr/>
+      </p:nvGrpSpPr>
+      <p:grpSpPr>
+        <a:xfrm>
+          <a:off x="0" y="0"/>
+          <a:ext cx="0" cy="0"/>
+          <a:chOff x="0" y="0"/>
+          <a:chExt cx="0" cy="0"/>
+        </a:xfrm>
+      </p:grpSpPr>
+      <p:sp>
+        <p:nvSpPr>
+          <p:cNvPr id="2" name="Title 1">
+            <a:extLst>
+              <a:ext uri="{FF2B5EF4-FFF2-40B4-BE49-F238E27FC236}">
+                <a16:creationId xmlns:a16="http://schemas.microsoft.com/office/drawing/2014/main" id="{E52A3659-191C-C732-7A37-4038501EDE64}"/>
+              </a:ext>
+            </a:extLst>
+          </p:cNvPr>
+          <p:cNvSpPr>
+            <a:spLocks noGrp="1"/>
+          </p:cNvSpPr>
+          <p:nvPr>
+            <p:ph type="title"/>
+          </p:nvPr>
+        </p:nvSpPr>
+        <p:spPr/>
+        <p:txBody>
+          <a:bodyPr/>
+          <a:lstStyle/>
+          <a:p>
+            <a:r>
+              <a:rPr lang="en-IN" dirty="0"/>
+              <a:t>What is Angular </a:t>
+            </a:r>
+            <a:r>
+              <a:rPr lang="en-US" dirty="0"/>
+              <a:t>schematic?</a:t>
+            </a:r>
+            <a:endParaRPr lang="en-IN" dirty="0"/>
+          </a:p>
+        </p:txBody>
+      </p:sp>
+      <p:sp>
+        <p:nvSpPr>
+          <p:cNvPr id="3" name="Content Placeholder 2">
+            <a:extLst>
+              <a:ext uri="{FF2B5EF4-FFF2-40B4-BE49-F238E27FC236}">
+                <a16:creationId xmlns:a16="http://schemas.microsoft.com/office/drawing/2014/main" id="{6D8F479F-C147-495E-60D3-091D797D349A}"/>
+              </a:ext>
+            </a:extLst>
+          </p:cNvPr>
+          <p:cNvSpPr>
+            <a:spLocks noGrp="1"/>
+          </p:cNvSpPr>
+          <p:nvPr>
+            <p:ph idx="1"/>
+          </p:nvPr>
+        </p:nvSpPr>
+        <p:spPr/>
+        <p:txBody>
+          <a:bodyPr/>
+          <a:lstStyle/>
+          <a:p>
+            <a:r>
+              <a:rPr lang="en-US" dirty="0"/>
+              <a:t>A schematic is a command-line tool provided by the Angular CLI (Command Line Interface) that helps developers generate code and modify project files based on predefined templates. </a:t>
+            </a:r>
+          </a:p>
+          <a:p>
+            <a:r>
+              <a:rPr lang="en-US" dirty="0"/>
+              <a:t>It automates repetitive tasks and provides a consistent way to create components, modules, services, and other Angular artifacts.</a:t>
+            </a:r>
+          </a:p>
+          <a:p>
+            <a:r>
+              <a:rPr lang="en-US" dirty="0"/>
+              <a:t>The Angular CLI includes a set of built-in schematics that can be used to generate different parts of an Angular application.</a:t>
+            </a:r>
+          </a:p>
+          <a:p>
+            <a:r>
+              <a:rPr lang="en-US" dirty="0"/>
+              <a:t>Developers can create their own custom schematics to generate code specific to their project requirements.</a:t>
+            </a:r>
+            <a:endParaRPr lang="en-IN" dirty="0"/>
+          </a:p>
+        </p:txBody>
+      </p:sp>
+    </p:spTree>
+    <p:extLst>
+      <p:ext uri="{BB962C8B-B14F-4D97-AF65-F5344CB8AC3E}">
+        <p14:creationId xmlns:p14="http://schemas.microsoft.com/office/powerpoint/2010/main" val="2078831676"/>
+      </p:ext>
+    </p:extLst>
+  </p:cSld>
+  <p:clrMapOvr>
+    <a:masterClrMapping/>
+  </p:clrMapOvr>
+</p:sld>
+</file>
+
+<file path=ppt/slides/slide88.xml><?xml version="1.0" encoding="utf-8"?>
+<p:sld xmlns:a="http://schemas.openxmlformats.org/drawingml/2006/main" xmlns:r="http://schemas.openxmlformats.org/officeDocument/2006/relationships" xmlns:p="http://schemas.openxmlformats.org/presentationml/2006/main">
+  <p:cSld>
     <p:bg>
       <p:bgPr>
         <a:solidFill>

</xml_diff>